<commit_message>
adding a couple slides
</commit_message>
<xml_diff>
--- a/2023-04-27 - Making Kubectl PowerShell friendly/PowerShell Summit 2023 - Making Kubectl PowerShell friendly.pptx
+++ b/2023-04-27 - Making Kubectl PowerShell friendly/PowerShell Summit 2023 - Making Kubectl PowerShell friendly.pptx
@@ -9,8 +9,10 @@
     <p:sldId id="257" r:id="rId3"/>
     <p:sldId id="273" r:id="rId4"/>
     <p:sldId id="272" r:id="rId5"/>
-    <p:sldId id="271" r:id="rId6"/>
-    <p:sldId id="268" r:id="rId7"/>
+    <p:sldId id="274" r:id="rId6"/>
+    <p:sldId id="275" r:id="rId7"/>
+    <p:sldId id="271" r:id="rId8"/>
+    <p:sldId id="268" r:id="rId9"/>
   </p:sldIdLst>
   <p:sldSz cx="12192000" cy="6858000"/>
   <p:notesSz cx="6858000" cy="9144000"/>
@@ -264,7 +266,7 @@
           <a:p>
             <a:fld id="{D46B952B-F692-4DD1-9678-FCDA40C3FC40}" type="datetimeFigureOut">
               <a:rPr lang="en-US" smtClean="0"/>
-              <a:t>3/19/2023</a:t>
+              <a:t>3/27/2023</a:t>
             </a:fld>
             <a:endParaRPr lang="en-US"/>
           </a:p>
@@ -462,7 +464,7 @@
           <a:p>
             <a:fld id="{D46B952B-F692-4DD1-9678-FCDA40C3FC40}" type="datetimeFigureOut">
               <a:rPr lang="en-US" smtClean="0"/>
-              <a:t>3/19/2023</a:t>
+              <a:t>3/27/2023</a:t>
             </a:fld>
             <a:endParaRPr lang="en-US"/>
           </a:p>
@@ -670,7 +672,7 @@
           <a:p>
             <a:fld id="{D46B952B-F692-4DD1-9678-FCDA40C3FC40}" type="datetimeFigureOut">
               <a:rPr lang="en-US" smtClean="0"/>
-              <a:t>3/19/2023</a:t>
+              <a:t>3/27/2023</a:t>
             </a:fld>
             <a:endParaRPr lang="en-US"/>
           </a:p>
@@ -868,7 +870,7 @@
           <a:p>
             <a:fld id="{D46B952B-F692-4DD1-9678-FCDA40C3FC40}" type="datetimeFigureOut">
               <a:rPr lang="en-US" smtClean="0"/>
-              <a:t>3/19/2023</a:t>
+              <a:t>3/27/2023</a:t>
             </a:fld>
             <a:endParaRPr lang="en-US"/>
           </a:p>
@@ -1143,7 +1145,7 @@
           <a:p>
             <a:fld id="{D46B952B-F692-4DD1-9678-FCDA40C3FC40}" type="datetimeFigureOut">
               <a:rPr lang="en-US" smtClean="0"/>
-              <a:t>3/19/2023</a:t>
+              <a:t>3/27/2023</a:t>
             </a:fld>
             <a:endParaRPr lang="en-US"/>
           </a:p>
@@ -1408,7 +1410,7 @@
           <a:p>
             <a:fld id="{D46B952B-F692-4DD1-9678-FCDA40C3FC40}" type="datetimeFigureOut">
               <a:rPr lang="en-US" smtClean="0"/>
-              <a:t>3/19/2023</a:t>
+              <a:t>3/27/2023</a:t>
             </a:fld>
             <a:endParaRPr lang="en-US"/>
           </a:p>
@@ -1820,7 +1822,7 @@
           <a:p>
             <a:fld id="{D46B952B-F692-4DD1-9678-FCDA40C3FC40}" type="datetimeFigureOut">
               <a:rPr lang="en-US" smtClean="0"/>
-              <a:t>3/19/2023</a:t>
+              <a:t>3/27/2023</a:t>
             </a:fld>
             <a:endParaRPr lang="en-US"/>
           </a:p>
@@ -1961,7 +1963,7 @@
           <a:p>
             <a:fld id="{D46B952B-F692-4DD1-9678-FCDA40C3FC40}" type="datetimeFigureOut">
               <a:rPr lang="en-US" smtClean="0"/>
-              <a:t>3/19/2023</a:t>
+              <a:t>3/27/2023</a:t>
             </a:fld>
             <a:endParaRPr lang="en-US"/>
           </a:p>
@@ -2074,7 +2076,7 @@
           <a:p>
             <a:fld id="{D46B952B-F692-4DD1-9678-FCDA40C3FC40}" type="datetimeFigureOut">
               <a:rPr lang="en-US" smtClean="0"/>
-              <a:t>3/19/2023</a:t>
+              <a:t>3/27/2023</a:t>
             </a:fld>
             <a:endParaRPr lang="en-US"/>
           </a:p>
@@ -2385,7 +2387,7 @@
           <a:p>
             <a:fld id="{D46B952B-F692-4DD1-9678-FCDA40C3FC40}" type="datetimeFigureOut">
               <a:rPr lang="en-US" smtClean="0"/>
-              <a:t>3/19/2023</a:t>
+              <a:t>3/27/2023</a:t>
             </a:fld>
             <a:endParaRPr lang="en-US"/>
           </a:p>
@@ -2673,7 +2675,7 @@
           <a:p>
             <a:fld id="{D46B952B-F692-4DD1-9678-FCDA40C3FC40}" type="datetimeFigureOut">
               <a:rPr lang="en-US" smtClean="0"/>
-              <a:t>3/19/2023</a:t>
+              <a:t>3/27/2023</a:t>
             </a:fld>
             <a:endParaRPr lang="en-US"/>
           </a:p>
@@ -2923,7 +2925,7 @@
           <a:p>
             <a:fld id="{D46B952B-F692-4DD1-9678-FCDA40C3FC40}" type="datetimeFigureOut">
               <a:rPr lang="en-US" smtClean="0"/>
-              <a:t>3/19/2023</a:t>
+              <a:t>3/27/2023</a:t>
             </a:fld>
             <a:endParaRPr lang="en-US"/>
           </a:p>
@@ -3373,7 +3375,7 @@
             </a:r>
             <a:r>
               <a:rPr lang="en-US" dirty="0"/>
-              <a:t> PowerShell friendly</a:t>
+              <a:t> PowerShell Friendly</a:t>
             </a:r>
           </a:p>
         </p:txBody>
@@ -3944,6 +3946,260 @@
           <p:cNvPr id="2" name="Title 1">
             <a:extLst>
               <a:ext uri="{FF2B5EF4-FFF2-40B4-BE49-F238E27FC236}">
+                <a16:creationId xmlns:a16="http://schemas.microsoft.com/office/drawing/2014/main" id="{A87E3C25-7C8C-0DF3-B75F-24DCA785DFAA}"/>
+              </a:ext>
+            </a:extLst>
+          </p:cNvPr>
+          <p:cNvSpPr>
+            <a:spLocks noGrp="1"/>
+          </p:cNvSpPr>
+          <p:nvPr>
+            <p:ph type="title"/>
+          </p:nvPr>
+        </p:nvSpPr>
+        <p:spPr/>
+        <p:txBody>
+          <a:bodyPr/>
+          <a:lstStyle/>
+          <a:p>
+            <a:r>
+              <a:rPr lang="en-US" dirty="0"/>
+              <a:t>The Problem</a:t>
+            </a:r>
+          </a:p>
+        </p:txBody>
+      </p:sp>
+      <p:sp>
+        <p:nvSpPr>
+          <p:cNvPr id="3" name="Content Placeholder 2">
+            <a:extLst>
+              <a:ext uri="{FF2B5EF4-FFF2-40B4-BE49-F238E27FC236}">
+                <a16:creationId xmlns:a16="http://schemas.microsoft.com/office/drawing/2014/main" id="{69A2A13C-0AAF-7AAC-9BE2-DD80D096953D}"/>
+              </a:ext>
+            </a:extLst>
+          </p:cNvPr>
+          <p:cNvSpPr>
+            <a:spLocks noGrp="1"/>
+          </p:cNvSpPr>
+          <p:nvPr>
+            <p:ph idx="1"/>
+          </p:nvPr>
+        </p:nvSpPr>
+        <p:spPr/>
+        <p:txBody>
+          <a:bodyPr/>
+          <a:lstStyle/>
+          <a:p>
+            <a:r>
+              <a:rPr lang="en-US" dirty="0" err="1"/>
+              <a:t>Kubectl</a:t>
+            </a:r>
+            <a:r>
+              <a:rPr lang="en-US" dirty="0"/>
+              <a:t> is just </a:t>
+            </a:r>
+            <a:r>
+              <a:rPr lang="en-US" dirty="0" err="1"/>
+              <a:t>stdout</a:t>
+            </a:r>
+            <a:endParaRPr lang="en-US" dirty="0"/>
+          </a:p>
+          <a:p>
+            <a:endParaRPr lang="en-US" dirty="0"/>
+          </a:p>
+        </p:txBody>
+      </p:sp>
+    </p:spTree>
+    <p:extLst>
+      <p:ext uri="{BB962C8B-B14F-4D97-AF65-F5344CB8AC3E}">
+        <p14:creationId xmlns:p14="http://schemas.microsoft.com/office/powerpoint/2010/main" val="1665671459"/>
+      </p:ext>
+    </p:extLst>
+  </p:cSld>
+  <p:clrMapOvr>
+    <a:masterClrMapping/>
+  </p:clrMapOvr>
+</p:sld>
+</file>
+
+<file path=ppt/slides/slide6.xml><?xml version="1.0" encoding="utf-8"?>
+<p:sld xmlns:a="http://schemas.openxmlformats.org/drawingml/2006/main" xmlns:r="http://schemas.openxmlformats.org/officeDocument/2006/relationships" xmlns:p="http://schemas.openxmlformats.org/presentationml/2006/main">
+  <p:cSld>
+    <p:spTree>
+      <p:nvGrpSpPr>
+        <p:cNvPr id="1" name=""/>
+        <p:cNvGrpSpPr/>
+        <p:nvPr/>
+      </p:nvGrpSpPr>
+      <p:grpSpPr>
+        <a:xfrm>
+          <a:off x="0" y="0"/>
+          <a:ext cx="0" cy="0"/>
+          <a:chOff x="0" y="0"/>
+          <a:chExt cx="0" cy="0"/>
+        </a:xfrm>
+      </p:grpSpPr>
+      <p:sp>
+        <p:nvSpPr>
+          <p:cNvPr id="2" name="Title 1">
+            <a:extLst>
+              <a:ext uri="{FF2B5EF4-FFF2-40B4-BE49-F238E27FC236}">
+                <a16:creationId xmlns:a16="http://schemas.microsoft.com/office/drawing/2014/main" id="{55B31744-ED95-32F9-D88F-27B03B231DE0}"/>
+              </a:ext>
+            </a:extLst>
+          </p:cNvPr>
+          <p:cNvSpPr>
+            <a:spLocks noGrp="1"/>
+          </p:cNvSpPr>
+          <p:nvPr>
+            <p:ph type="title"/>
+          </p:nvPr>
+        </p:nvSpPr>
+        <p:spPr/>
+        <p:txBody>
+          <a:bodyPr/>
+          <a:lstStyle/>
+          <a:p>
+            <a:r>
+              <a:rPr lang="en-US" dirty="0"/>
+              <a:t>Crescendo or -o </a:t>
+            </a:r>
+            <a:r>
+              <a:rPr lang="en-US" dirty="0" err="1"/>
+              <a:t>json</a:t>
+            </a:r>
+            <a:r>
+              <a:rPr lang="en-US" dirty="0"/>
+              <a:t>?</a:t>
+            </a:r>
+          </a:p>
+        </p:txBody>
+      </p:sp>
+      <p:sp>
+        <p:nvSpPr>
+          <p:cNvPr id="3" name="Content Placeholder 2">
+            <a:extLst>
+              <a:ext uri="{FF2B5EF4-FFF2-40B4-BE49-F238E27FC236}">
+                <a16:creationId xmlns:a16="http://schemas.microsoft.com/office/drawing/2014/main" id="{22AB60D4-7F39-36CB-F888-35C18D054A28}"/>
+              </a:ext>
+            </a:extLst>
+          </p:cNvPr>
+          <p:cNvSpPr>
+            <a:spLocks noGrp="1"/>
+          </p:cNvSpPr>
+          <p:nvPr>
+            <p:ph idx="1"/>
+          </p:nvPr>
+        </p:nvSpPr>
+        <p:spPr/>
+        <p:txBody>
+          <a:bodyPr/>
+          <a:lstStyle/>
+          <a:p>
+            <a:r>
+              <a:rPr lang="en-US" dirty="0"/>
+              <a:t>Crescendo</a:t>
+            </a:r>
+          </a:p>
+          <a:p>
+            <a:pPr lvl="1"/>
+            <a:r>
+              <a:rPr lang="en-US" dirty="0"/>
+              <a:t>Definitely more PowerShell-y (verb-noun)</a:t>
+            </a:r>
+          </a:p>
+          <a:p>
+            <a:pPr lvl="1"/>
+            <a:r>
+              <a:rPr lang="en-US" dirty="0"/>
+              <a:t>Not cross-shell compatible</a:t>
+            </a:r>
+          </a:p>
+          <a:p>
+            <a:pPr lvl="1"/>
+            <a:r>
+              <a:rPr lang="en-US" dirty="0"/>
+              <a:t>Not a bad tool, just not the right tool for the job</a:t>
+            </a:r>
+          </a:p>
+          <a:p>
+            <a:r>
+              <a:rPr lang="en-US" dirty="0" err="1"/>
+              <a:t>kubectl</a:t>
+            </a:r>
+            <a:r>
+              <a:rPr lang="en-US" dirty="0"/>
+              <a:t> get pod -o </a:t>
+            </a:r>
+            <a:r>
+              <a:rPr lang="en-US" dirty="0" err="1"/>
+              <a:t>json</a:t>
+            </a:r>
+            <a:r>
+              <a:rPr lang="en-US" dirty="0"/>
+              <a:t> | </a:t>
+            </a:r>
+            <a:r>
+              <a:rPr lang="en-US" dirty="0" err="1"/>
+              <a:t>ConvertFrom-Json</a:t>
+            </a:r>
+            <a:endParaRPr lang="en-US" dirty="0"/>
+          </a:p>
+          <a:p>
+            <a:pPr lvl="1"/>
+            <a:r>
+              <a:rPr lang="en-US" dirty="0"/>
+              <a:t>Too much typing</a:t>
+            </a:r>
+          </a:p>
+          <a:p>
+            <a:pPr lvl="1"/>
+            <a:r>
+              <a:rPr lang="en-US" dirty="0"/>
+              <a:t>More data</a:t>
+            </a:r>
+          </a:p>
+          <a:p>
+            <a:pPr lvl="1"/>
+            <a:endParaRPr lang="en-US" dirty="0"/>
+          </a:p>
+        </p:txBody>
+      </p:sp>
+    </p:spTree>
+    <p:extLst>
+      <p:ext uri="{BB962C8B-B14F-4D97-AF65-F5344CB8AC3E}">
+        <p14:creationId xmlns:p14="http://schemas.microsoft.com/office/powerpoint/2010/main" val="1120469968"/>
+      </p:ext>
+    </p:extLst>
+  </p:cSld>
+  <p:clrMapOvr>
+    <a:masterClrMapping/>
+  </p:clrMapOvr>
+</p:sld>
+</file>
+
+<file path=ppt/slides/slide7.xml><?xml version="1.0" encoding="utf-8"?>
+<p:sld xmlns:a="http://schemas.openxmlformats.org/drawingml/2006/main" xmlns:r="http://schemas.openxmlformats.org/officeDocument/2006/relationships" xmlns:p="http://schemas.openxmlformats.org/presentationml/2006/main">
+  <p:cSld>
+    <p:spTree>
+      <p:nvGrpSpPr>
+        <p:cNvPr id="1" name=""/>
+        <p:cNvGrpSpPr/>
+        <p:nvPr/>
+      </p:nvGrpSpPr>
+      <p:grpSpPr>
+        <a:xfrm>
+          <a:off x="0" y="0"/>
+          <a:ext cx="0" cy="0"/>
+          <a:chOff x="0" y="0"/>
+          <a:chExt cx="0" cy="0"/>
+        </a:xfrm>
+      </p:grpSpPr>
+      <p:sp>
+        <p:nvSpPr>
+          <p:cNvPr id="2" name="Title 1">
+            <a:extLst>
+              <a:ext uri="{FF2B5EF4-FFF2-40B4-BE49-F238E27FC236}">
                 <a16:creationId xmlns:a16="http://schemas.microsoft.com/office/drawing/2014/main" id="{848E72F1-F67E-4AEF-9E86-14F48B4E54AB}"/>
               </a:ext>
             </a:extLst>
@@ -4015,7 +4271,7 @@
 </p:sld>
 </file>
 
-<file path=ppt/slides/slide6.xml><?xml version="1.0" encoding="utf-8"?>
+<file path=ppt/slides/slide8.xml><?xml version="1.0" encoding="utf-8"?>
 <p:sld xmlns:a="http://schemas.openxmlformats.org/drawingml/2006/main" xmlns:r="http://schemas.openxmlformats.org/officeDocument/2006/relationships" xmlns:p="http://schemas.openxmlformats.org/presentationml/2006/main">
   <p:cSld>
     <p:spTree>

</xml_diff>

<commit_message>
adding some additional slides
</commit_message>
<xml_diff>
--- a/2023-04-27 - Making Kubectl PowerShell friendly/PowerShell Summit 2023 - Making Kubectl PowerShell friendly.pptx
+++ b/2023-04-27 - Making Kubectl PowerShell friendly/PowerShell Summit 2023 - Making Kubectl PowerShell friendly.pptx
@@ -7,12 +7,13 @@
   <p:sldIdLst>
     <p:sldId id="256" r:id="rId2"/>
     <p:sldId id="257" r:id="rId3"/>
-    <p:sldId id="273" r:id="rId4"/>
-    <p:sldId id="272" r:id="rId5"/>
+    <p:sldId id="272" r:id="rId4"/>
+    <p:sldId id="273" r:id="rId5"/>
     <p:sldId id="274" r:id="rId6"/>
     <p:sldId id="275" r:id="rId7"/>
-    <p:sldId id="271" r:id="rId8"/>
-    <p:sldId id="268" r:id="rId9"/>
+    <p:sldId id="276" r:id="rId8"/>
+    <p:sldId id="271" r:id="rId9"/>
+    <p:sldId id="268" r:id="rId10"/>
   </p:sldIdLst>
   <p:sldSz cx="12192000" cy="6858000"/>
   <p:notesSz cx="6858000" cy="9144000"/>
@@ -266,7 +267,7 @@
           <a:p>
             <a:fld id="{D46B952B-F692-4DD1-9678-FCDA40C3FC40}" type="datetimeFigureOut">
               <a:rPr lang="en-US" smtClean="0"/>
-              <a:t>3/27/2023</a:t>
+              <a:t>4/2/2023</a:t>
             </a:fld>
             <a:endParaRPr lang="en-US"/>
           </a:p>
@@ -464,7 +465,7 @@
           <a:p>
             <a:fld id="{D46B952B-F692-4DD1-9678-FCDA40C3FC40}" type="datetimeFigureOut">
               <a:rPr lang="en-US" smtClean="0"/>
-              <a:t>3/27/2023</a:t>
+              <a:t>4/2/2023</a:t>
             </a:fld>
             <a:endParaRPr lang="en-US"/>
           </a:p>
@@ -672,7 +673,7 @@
           <a:p>
             <a:fld id="{D46B952B-F692-4DD1-9678-FCDA40C3FC40}" type="datetimeFigureOut">
               <a:rPr lang="en-US" smtClean="0"/>
-              <a:t>3/27/2023</a:t>
+              <a:t>4/2/2023</a:t>
             </a:fld>
             <a:endParaRPr lang="en-US"/>
           </a:p>
@@ -870,7 +871,7 @@
           <a:p>
             <a:fld id="{D46B952B-F692-4DD1-9678-FCDA40C3FC40}" type="datetimeFigureOut">
               <a:rPr lang="en-US" smtClean="0"/>
-              <a:t>3/27/2023</a:t>
+              <a:t>4/2/2023</a:t>
             </a:fld>
             <a:endParaRPr lang="en-US"/>
           </a:p>
@@ -1145,7 +1146,7 @@
           <a:p>
             <a:fld id="{D46B952B-F692-4DD1-9678-FCDA40C3FC40}" type="datetimeFigureOut">
               <a:rPr lang="en-US" smtClean="0"/>
-              <a:t>3/27/2023</a:t>
+              <a:t>4/2/2023</a:t>
             </a:fld>
             <a:endParaRPr lang="en-US"/>
           </a:p>
@@ -1410,7 +1411,7 @@
           <a:p>
             <a:fld id="{D46B952B-F692-4DD1-9678-FCDA40C3FC40}" type="datetimeFigureOut">
               <a:rPr lang="en-US" smtClean="0"/>
-              <a:t>3/27/2023</a:t>
+              <a:t>4/2/2023</a:t>
             </a:fld>
             <a:endParaRPr lang="en-US"/>
           </a:p>
@@ -1822,7 +1823,7 @@
           <a:p>
             <a:fld id="{D46B952B-F692-4DD1-9678-FCDA40C3FC40}" type="datetimeFigureOut">
               <a:rPr lang="en-US" smtClean="0"/>
-              <a:t>3/27/2023</a:t>
+              <a:t>4/2/2023</a:t>
             </a:fld>
             <a:endParaRPr lang="en-US"/>
           </a:p>
@@ -1963,7 +1964,7 @@
           <a:p>
             <a:fld id="{D46B952B-F692-4DD1-9678-FCDA40C3FC40}" type="datetimeFigureOut">
               <a:rPr lang="en-US" smtClean="0"/>
-              <a:t>3/27/2023</a:t>
+              <a:t>4/2/2023</a:t>
             </a:fld>
             <a:endParaRPr lang="en-US"/>
           </a:p>
@@ -2076,7 +2077,7 @@
           <a:p>
             <a:fld id="{D46B952B-F692-4DD1-9678-FCDA40C3FC40}" type="datetimeFigureOut">
               <a:rPr lang="en-US" smtClean="0"/>
-              <a:t>3/27/2023</a:t>
+              <a:t>4/2/2023</a:t>
             </a:fld>
             <a:endParaRPr lang="en-US"/>
           </a:p>
@@ -2387,7 +2388,7 @@
           <a:p>
             <a:fld id="{D46B952B-F692-4DD1-9678-FCDA40C3FC40}" type="datetimeFigureOut">
               <a:rPr lang="en-US" smtClean="0"/>
-              <a:t>3/27/2023</a:t>
+              <a:t>4/2/2023</a:t>
             </a:fld>
             <a:endParaRPr lang="en-US"/>
           </a:p>
@@ -2675,7 +2676,7 @@
           <a:p>
             <a:fld id="{D46B952B-F692-4DD1-9678-FCDA40C3FC40}" type="datetimeFigureOut">
               <a:rPr lang="en-US" smtClean="0"/>
-              <a:t>3/27/2023</a:t>
+              <a:t>4/2/2023</a:t>
             </a:fld>
             <a:endParaRPr lang="en-US"/>
           </a:p>
@@ -2925,7 +2926,7 @@
           <a:p>
             <a:fld id="{D46B952B-F692-4DD1-9678-FCDA40C3FC40}" type="datetimeFigureOut">
               <a:rPr lang="en-US" smtClean="0"/>
-              <a:t>3/27/2023</a:t>
+              <a:t>4/2/2023</a:t>
             </a:fld>
             <a:endParaRPr lang="en-US"/>
           </a:p>
@@ -3732,7 +3733,7 @@
           <p:cNvPr id="2" name="Title 1">
             <a:extLst>
               <a:ext uri="{FF2B5EF4-FFF2-40B4-BE49-F238E27FC236}">
-                <a16:creationId xmlns:a16="http://schemas.microsoft.com/office/drawing/2014/main" id="{E57020CE-8FBE-281A-B2F7-6C2265E2F6AB}"/>
+                <a16:creationId xmlns:a16="http://schemas.microsoft.com/office/drawing/2014/main" id="{96AECC9F-F8E0-7E40-1412-B173A2E614A6}"/>
               </a:ext>
             </a:extLst>
           </p:cNvPr>
@@ -3750,40 +3751,88 @@
           <a:p>
             <a:r>
               <a:rPr lang="en-US" dirty="0"/>
-              <a:t>CAUTION: Opinion ahead</a:t>
-            </a:r>
-          </a:p>
-        </p:txBody>
-      </p:sp>
-      <p:sp>
-        <p:nvSpPr>
-          <p:cNvPr id="3" name="Text Placeholder 2">
-            <a:extLst>
-              <a:ext uri="{FF2B5EF4-FFF2-40B4-BE49-F238E27FC236}">
-                <a16:creationId xmlns:a16="http://schemas.microsoft.com/office/drawing/2014/main" id="{51546B94-BED6-8140-69A5-6134CBA6B2D6}"/>
-              </a:ext>
-            </a:extLst>
-          </p:cNvPr>
-          <p:cNvSpPr>
-            <a:spLocks noGrp="1"/>
-          </p:cNvSpPr>
-          <p:nvPr>
-            <p:ph type="body" idx="1"/>
-          </p:nvPr>
-        </p:nvSpPr>
-        <p:spPr/>
-        <p:txBody>
-          <a:bodyPr/>
-          <a:lstStyle/>
-          <a:p>
-            <a:endParaRPr lang="en-US"/>
+              <a:t>Overview</a:t>
+            </a:r>
+          </a:p>
+        </p:txBody>
+      </p:sp>
+      <p:sp>
+        <p:nvSpPr>
+          <p:cNvPr id="3" name="Content Placeholder 2">
+            <a:extLst>
+              <a:ext uri="{FF2B5EF4-FFF2-40B4-BE49-F238E27FC236}">
+                <a16:creationId xmlns:a16="http://schemas.microsoft.com/office/drawing/2014/main" id="{7A554A8C-6110-28A1-7F86-ED7456104449}"/>
+              </a:ext>
+            </a:extLst>
+          </p:cNvPr>
+          <p:cNvSpPr>
+            <a:spLocks noGrp="1"/>
+          </p:cNvSpPr>
+          <p:nvPr>
+            <p:ph idx="1"/>
+          </p:nvPr>
+        </p:nvSpPr>
+        <p:spPr/>
+        <p:txBody>
+          <a:bodyPr/>
+          <a:lstStyle/>
+          <a:p>
+            <a:r>
+              <a:rPr lang="en-US" dirty="0"/>
+              <a:t>What is the problem?</a:t>
+            </a:r>
+          </a:p>
+          <a:p>
+            <a:r>
+              <a:rPr lang="en-US" dirty="0"/>
+              <a:t>Why not Crescendo or -o </a:t>
+            </a:r>
+            <a:r>
+              <a:rPr lang="en-US" dirty="0" err="1"/>
+              <a:t>json</a:t>
+            </a:r>
+            <a:r>
+              <a:rPr lang="en-US" dirty="0"/>
+              <a:t>?</a:t>
+            </a:r>
+          </a:p>
+          <a:p>
+            <a:r>
+              <a:rPr lang="en-US" dirty="0"/>
+              <a:t>Technical solution</a:t>
+            </a:r>
+          </a:p>
+          <a:p>
+            <a:pPr lvl="1"/>
+            <a:r>
+              <a:rPr lang="en-US" dirty="0"/>
+              <a:t>Parsing output</a:t>
+            </a:r>
+          </a:p>
+          <a:p>
+            <a:pPr lvl="1"/>
+            <a:r>
+              <a:rPr lang="en-US" dirty="0"/>
+              <a:t>Generating PowerShell formats</a:t>
+            </a:r>
+          </a:p>
+          <a:p>
+            <a:r>
+              <a:rPr lang="en-US" dirty="0"/>
+              <a:t>Reducing reliance </a:t>
+            </a:r>
+            <a:r>
+              <a:rPr lang="en-US"/>
+              <a:t>on Where-Object</a:t>
+            </a:r>
+            <a:endParaRPr lang="en-US" dirty="0"/>
           </a:p>
         </p:txBody>
       </p:sp>
     </p:spTree>
     <p:extLst>
       <p:ext uri="{BB962C8B-B14F-4D97-AF65-F5344CB8AC3E}">
-        <p14:creationId xmlns:p14="http://schemas.microsoft.com/office/powerpoint/2010/main" val="2184799276"/>
+        <p14:creationId xmlns:p14="http://schemas.microsoft.com/office/powerpoint/2010/main" val="2222653195"/>
       </p:ext>
     </p:extLst>
   </p:cSld>
@@ -3815,7 +3864,7 @@
           <p:cNvPr id="2" name="Title 1">
             <a:extLst>
               <a:ext uri="{FF2B5EF4-FFF2-40B4-BE49-F238E27FC236}">
-                <a16:creationId xmlns:a16="http://schemas.microsoft.com/office/drawing/2014/main" id="{96AECC9F-F8E0-7E40-1412-B173A2E614A6}"/>
+                <a16:creationId xmlns:a16="http://schemas.microsoft.com/office/drawing/2014/main" id="{E57020CE-8FBE-281A-B2F7-6C2265E2F6AB}"/>
               </a:ext>
             </a:extLst>
           </p:cNvPr>
@@ -3833,88 +3882,40 @@
           <a:p>
             <a:r>
               <a:rPr lang="en-US" dirty="0"/>
-              <a:t>Overview</a:t>
-            </a:r>
-          </a:p>
-        </p:txBody>
-      </p:sp>
-      <p:sp>
-        <p:nvSpPr>
-          <p:cNvPr id="3" name="Content Placeholder 2">
-            <a:extLst>
-              <a:ext uri="{FF2B5EF4-FFF2-40B4-BE49-F238E27FC236}">
-                <a16:creationId xmlns:a16="http://schemas.microsoft.com/office/drawing/2014/main" id="{7A554A8C-6110-28A1-7F86-ED7456104449}"/>
-              </a:ext>
-            </a:extLst>
-          </p:cNvPr>
-          <p:cNvSpPr>
-            <a:spLocks noGrp="1"/>
-          </p:cNvSpPr>
-          <p:nvPr>
-            <p:ph idx="1"/>
-          </p:nvPr>
-        </p:nvSpPr>
-        <p:spPr/>
-        <p:txBody>
-          <a:bodyPr/>
-          <a:lstStyle/>
-          <a:p>
-            <a:r>
-              <a:rPr lang="en-US" dirty="0"/>
-              <a:t>What is the problem?</a:t>
-            </a:r>
-          </a:p>
-          <a:p>
-            <a:r>
-              <a:rPr lang="en-US" dirty="0"/>
-              <a:t>Why not Crescendo or -o </a:t>
-            </a:r>
-            <a:r>
-              <a:rPr lang="en-US" dirty="0" err="1"/>
-              <a:t>json</a:t>
-            </a:r>
-            <a:r>
-              <a:rPr lang="en-US" dirty="0"/>
-              <a:t>?</a:t>
-            </a:r>
-          </a:p>
-          <a:p>
-            <a:r>
-              <a:rPr lang="en-US" dirty="0"/>
-              <a:t>Technical solution</a:t>
-            </a:r>
-          </a:p>
-          <a:p>
-            <a:pPr lvl="1"/>
-            <a:r>
-              <a:rPr lang="en-US" dirty="0"/>
-              <a:t>Parsing output</a:t>
-            </a:r>
-          </a:p>
-          <a:p>
-            <a:pPr lvl="1"/>
-            <a:r>
-              <a:rPr lang="en-US" dirty="0"/>
-              <a:t>Generating PowerShell formats</a:t>
-            </a:r>
-          </a:p>
-          <a:p>
-            <a:r>
-              <a:rPr lang="en-US" dirty="0"/>
-              <a:t>Reducing reliance </a:t>
-            </a:r>
-            <a:r>
-              <a:rPr lang="en-US"/>
-              <a:t>on Where-Object</a:t>
-            </a:r>
-            <a:endParaRPr lang="en-US" dirty="0"/>
+              <a:t>CAUTION: Opinion ahead</a:t>
+            </a:r>
+          </a:p>
+        </p:txBody>
+      </p:sp>
+      <p:sp>
+        <p:nvSpPr>
+          <p:cNvPr id="3" name="Text Placeholder 2">
+            <a:extLst>
+              <a:ext uri="{FF2B5EF4-FFF2-40B4-BE49-F238E27FC236}">
+                <a16:creationId xmlns:a16="http://schemas.microsoft.com/office/drawing/2014/main" id="{51546B94-BED6-8140-69A5-6134CBA6B2D6}"/>
+              </a:ext>
+            </a:extLst>
+          </p:cNvPr>
+          <p:cNvSpPr>
+            <a:spLocks noGrp="1"/>
+          </p:cNvSpPr>
+          <p:nvPr>
+            <p:ph type="body" idx="1"/>
+          </p:nvPr>
+        </p:nvSpPr>
+        <p:spPr/>
+        <p:txBody>
+          <a:bodyPr/>
+          <a:lstStyle/>
+          <a:p>
+            <a:endParaRPr lang="en-US"/>
           </a:p>
         </p:txBody>
       </p:sp>
     </p:spTree>
     <p:extLst>
       <p:ext uri="{BB962C8B-B14F-4D97-AF65-F5344CB8AC3E}">
-        <p14:creationId xmlns:p14="http://schemas.microsoft.com/office/powerpoint/2010/main" val="2222653195"/>
+        <p14:creationId xmlns:p14="http://schemas.microsoft.com/office/powerpoint/2010/main" val="2184799276"/>
       </p:ext>
     </p:extLst>
   </p:cSld>
@@ -4156,8 +4157,13 @@
             <a:pPr lvl="1"/>
             <a:r>
               <a:rPr lang="en-US" dirty="0"/>
-              <a:t>More data</a:t>
-            </a:r>
+              <a:t>Too much data</a:t>
+            </a:r>
+            <a:r>
+              <a:rPr lang="en-US"/>
+              <a:t>, usually</a:t>
+            </a:r>
+            <a:endParaRPr lang="en-US" dirty="0"/>
           </a:p>
           <a:p>
             <a:pPr lvl="1"/>
@@ -4200,7 +4206,7 @@
           <p:cNvPr id="2" name="Title 1">
             <a:extLst>
               <a:ext uri="{FF2B5EF4-FFF2-40B4-BE49-F238E27FC236}">
-                <a16:creationId xmlns:a16="http://schemas.microsoft.com/office/drawing/2014/main" id="{848E72F1-F67E-4AEF-9E86-14F48B4E54AB}"/>
+                <a16:creationId xmlns:a16="http://schemas.microsoft.com/office/drawing/2014/main" id="{B67A068A-AAB9-C73E-81A8-19055B382B75}"/>
               </a:ext>
             </a:extLst>
           </p:cNvPr>
@@ -4218,50 +4224,44 @@
           <a:p>
             <a:r>
               <a:rPr lang="en-US" dirty="0"/>
-              <a:t>Prerequisites </a:t>
-            </a:r>
-          </a:p>
-        </p:txBody>
-      </p:sp>
-      <p:sp>
-        <p:nvSpPr>
-          <p:cNvPr id="3" name="Content Placeholder 2">
-            <a:extLst>
-              <a:ext uri="{FF2B5EF4-FFF2-40B4-BE49-F238E27FC236}">
-                <a16:creationId xmlns:a16="http://schemas.microsoft.com/office/drawing/2014/main" id="{6420E0E3-B7A2-4D43-9E12-6ABB0339C165}"/>
-              </a:ext>
-            </a:extLst>
-          </p:cNvPr>
-          <p:cNvSpPr>
-            <a:spLocks noGrp="1"/>
-          </p:cNvSpPr>
+              <a:t>My Solution</a:t>
+            </a:r>
+          </a:p>
+        </p:txBody>
+      </p:sp>
+      <p:pic>
+        <p:nvPicPr>
+          <p:cNvPr id="11" name="Content Placeholder 10">
+            <a:extLst>
+              <a:ext uri="{FF2B5EF4-FFF2-40B4-BE49-F238E27FC236}">
+                <a16:creationId xmlns:a16="http://schemas.microsoft.com/office/drawing/2014/main" id="{F9D21534-55BD-FF98-26CC-A2241B273CB0}"/>
+              </a:ext>
+            </a:extLst>
+          </p:cNvPr>
+          <p:cNvPicPr>
+            <a:picLocks noGrp="1" noChangeAspect="1"/>
+          </p:cNvPicPr>
           <p:nvPr>
             <p:ph idx="1"/>
           </p:nvPr>
-        </p:nvSpPr>
-        <p:spPr/>
-        <p:txBody>
-          <a:bodyPr/>
-          <a:lstStyle/>
-          <a:p>
-            <a:r>
-              <a:rPr lang="en-US" dirty="0"/>
-              <a:t>PowerShell</a:t>
-            </a:r>
-          </a:p>
-          <a:p>
-            <a:r>
-              <a:rPr lang="en-US" dirty="0" err="1"/>
-              <a:t>Kubectl</a:t>
-            </a:r>
-            <a:endParaRPr lang="en-US" dirty="0"/>
-          </a:p>
-        </p:txBody>
-      </p:sp>
+        </p:nvPicPr>
+        <p:blipFill>
+          <a:blip r:embed="rId2"/>
+          <a:stretch>
+            <a:fillRect/>
+          </a:stretch>
+        </p:blipFill>
+        <p:spPr>
+          <a:xfrm>
+            <a:off x="1904943" y="1825625"/>
+            <a:ext cx="8382113" cy="4351338"/>
+          </a:xfrm>
+        </p:spPr>
+      </p:pic>
     </p:spTree>
     <p:extLst>
       <p:ext uri="{BB962C8B-B14F-4D97-AF65-F5344CB8AC3E}">
-        <p14:creationId xmlns:p14="http://schemas.microsoft.com/office/powerpoint/2010/main" val="4066512176"/>
+        <p14:creationId xmlns:p14="http://schemas.microsoft.com/office/powerpoint/2010/main" val="1736254790"/>
       </p:ext>
     </p:extLst>
   </p:cSld>
@@ -4293,6 +4293,99 @@
           <p:cNvPr id="2" name="Title 1">
             <a:extLst>
               <a:ext uri="{FF2B5EF4-FFF2-40B4-BE49-F238E27FC236}">
+                <a16:creationId xmlns:a16="http://schemas.microsoft.com/office/drawing/2014/main" id="{848E72F1-F67E-4AEF-9E86-14F48B4E54AB}"/>
+              </a:ext>
+            </a:extLst>
+          </p:cNvPr>
+          <p:cNvSpPr>
+            <a:spLocks noGrp="1"/>
+          </p:cNvSpPr>
+          <p:nvPr>
+            <p:ph type="title"/>
+          </p:nvPr>
+        </p:nvSpPr>
+        <p:spPr/>
+        <p:txBody>
+          <a:bodyPr/>
+          <a:lstStyle/>
+          <a:p>
+            <a:r>
+              <a:rPr lang="en-US" dirty="0"/>
+              <a:t>Prerequisites </a:t>
+            </a:r>
+          </a:p>
+        </p:txBody>
+      </p:sp>
+      <p:sp>
+        <p:nvSpPr>
+          <p:cNvPr id="3" name="Content Placeholder 2">
+            <a:extLst>
+              <a:ext uri="{FF2B5EF4-FFF2-40B4-BE49-F238E27FC236}">
+                <a16:creationId xmlns:a16="http://schemas.microsoft.com/office/drawing/2014/main" id="{6420E0E3-B7A2-4D43-9E12-6ABB0339C165}"/>
+              </a:ext>
+            </a:extLst>
+          </p:cNvPr>
+          <p:cNvSpPr>
+            <a:spLocks noGrp="1"/>
+          </p:cNvSpPr>
+          <p:nvPr>
+            <p:ph idx="1"/>
+          </p:nvPr>
+        </p:nvSpPr>
+        <p:spPr/>
+        <p:txBody>
+          <a:bodyPr/>
+          <a:lstStyle/>
+          <a:p>
+            <a:r>
+              <a:rPr lang="en-US" dirty="0"/>
+              <a:t>PowerShell</a:t>
+            </a:r>
+          </a:p>
+          <a:p>
+            <a:r>
+              <a:rPr lang="en-US" dirty="0" err="1"/>
+              <a:t>Kubectl</a:t>
+            </a:r>
+            <a:endParaRPr lang="en-US" dirty="0"/>
+          </a:p>
+        </p:txBody>
+      </p:sp>
+    </p:spTree>
+    <p:extLst>
+      <p:ext uri="{BB962C8B-B14F-4D97-AF65-F5344CB8AC3E}">
+        <p14:creationId xmlns:p14="http://schemas.microsoft.com/office/powerpoint/2010/main" val="4066512176"/>
+      </p:ext>
+    </p:extLst>
+  </p:cSld>
+  <p:clrMapOvr>
+    <a:masterClrMapping/>
+  </p:clrMapOvr>
+</p:sld>
+</file>
+
+<file path=ppt/slides/slide9.xml><?xml version="1.0" encoding="utf-8"?>
+<p:sld xmlns:a="http://schemas.openxmlformats.org/drawingml/2006/main" xmlns:r="http://schemas.openxmlformats.org/officeDocument/2006/relationships" xmlns:p="http://schemas.openxmlformats.org/presentationml/2006/main">
+  <p:cSld>
+    <p:spTree>
+      <p:nvGrpSpPr>
+        <p:cNvPr id="1" name=""/>
+        <p:cNvGrpSpPr/>
+        <p:nvPr/>
+      </p:nvGrpSpPr>
+      <p:grpSpPr>
+        <a:xfrm>
+          <a:off x="0" y="0"/>
+          <a:ext cx="0" cy="0"/>
+          <a:chOff x="0" y="0"/>
+          <a:chExt cx="0" cy="0"/>
+        </a:xfrm>
+      </p:grpSpPr>
+      <p:sp>
+        <p:nvSpPr>
+          <p:cNvPr id="2" name="Title 1">
+            <a:extLst>
+              <a:ext uri="{FF2B5EF4-FFF2-40B4-BE49-F238E27FC236}">
                 <a16:creationId xmlns:a16="http://schemas.microsoft.com/office/drawing/2014/main" id="{F1661924-E51B-4AA1-A1C5-C9AD9EE32D81}"/>
               </a:ext>
             </a:extLst>
@@ -4353,6 +4446,14 @@
               <a:rPr lang="en-US" dirty="0"/>
               <a:t>PowerShell 7.3.3</a:t>
             </a:r>
+          </a:p>
+          <a:p>
+            <a:pPr lvl="1"/>
+            <a:r>
+              <a:rPr lang="en-US" dirty="0" err="1"/>
+              <a:t>specialK</a:t>
+            </a:r>
+            <a:endParaRPr lang="en-US" dirty="0"/>
           </a:p>
           <a:p>
             <a:r>

</xml_diff>

<commit_message>
adding some demo code
</commit_message>
<xml_diff>
--- a/2023-04-27 - Making Kubectl PowerShell friendly/PowerShell Summit 2023 - Making Kubectl PowerShell friendly.pptx
+++ b/2023-04-27 - Making Kubectl PowerShell friendly/PowerShell Summit 2023 - Making Kubectl PowerShell friendly.pptx
@@ -17,8 +17,11 @@
     <p:sldId id="268" r:id="rId11"/>
     <p:sldId id="278" r:id="rId12"/>
     <p:sldId id="281" r:id="rId13"/>
-    <p:sldId id="279" r:id="rId14"/>
-    <p:sldId id="280" r:id="rId15"/>
+    <p:sldId id="283" r:id="rId14"/>
+    <p:sldId id="285" r:id="rId15"/>
+    <p:sldId id="284" r:id="rId16"/>
+    <p:sldId id="279" r:id="rId17"/>
+    <p:sldId id="280" r:id="rId18"/>
   </p:sldIdLst>
   <p:sldSz cx="12192000" cy="6858000"/>
   <p:notesSz cx="6858000" cy="9144000"/>
@@ -272,7 +275,7 @@
           <a:p>
             <a:fld id="{D46B952B-F692-4DD1-9678-FCDA40C3FC40}" type="datetimeFigureOut">
               <a:rPr lang="en-US" smtClean="0"/>
-              <a:t>4/9/2023</a:t>
+              <a:t>4/16/2023</a:t>
             </a:fld>
             <a:endParaRPr lang="en-US"/>
           </a:p>
@@ -470,7 +473,7 @@
           <a:p>
             <a:fld id="{D46B952B-F692-4DD1-9678-FCDA40C3FC40}" type="datetimeFigureOut">
               <a:rPr lang="en-US" smtClean="0"/>
-              <a:t>4/9/2023</a:t>
+              <a:t>4/16/2023</a:t>
             </a:fld>
             <a:endParaRPr lang="en-US"/>
           </a:p>
@@ -678,7 +681,7 @@
           <a:p>
             <a:fld id="{D46B952B-F692-4DD1-9678-FCDA40C3FC40}" type="datetimeFigureOut">
               <a:rPr lang="en-US" smtClean="0"/>
-              <a:t>4/9/2023</a:t>
+              <a:t>4/16/2023</a:t>
             </a:fld>
             <a:endParaRPr lang="en-US"/>
           </a:p>
@@ -876,7 +879,7 @@
           <a:p>
             <a:fld id="{D46B952B-F692-4DD1-9678-FCDA40C3FC40}" type="datetimeFigureOut">
               <a:rPr lang="en-US" smtClean="0"/>
-              <a:t>4/9/2023</a:t>
+              <a:t>4/16/2023</a:t>
             </a:fld>
             <a:endParaRPr lang="en-US"/>
           </a:p>
@@ -1151,7 +1154,7 @@
           <a:p>
             <a:fld id="{D46B952B-F692-4DD1-9678-FCDA40C3FC40}" type="datetimeFigureOut">
               <a:rPr lang="en-US" smtClean="0"/>
-              <a:t>4/9/2023</a:t>
+              <a:t>4/16/2023</a:t>
             </a:fld>
             <a:endParaRPr lang="en-US"/>
           </a:p>
@@ -1416,7 +1419,7 @@
           <a:p>
             <a:fld id="{D46B952B-F692-4DD1-9678-FCDA40C3FC40}" type="datetimeFigureOut">
               <a:rPr lang="en-US" smtClean="0"/>
-              <a:t>4/9/2023</a:t>
+              <a:t>4/16/2023</a:t>
             </a:fld>
             <a:endParaRPr lang="en-US"/>
           </a:p>
@@ -1828,7 +1831,7 @@
           <a:p>
             <a:fld id="{D46B952B-F692-4DD1-9678-FCDA40C3FC40}" type="datetimeFigureOut">
               <a:rPr lang="en-US" smtClean="0"/>
-              <a:t>4/9/2023</a:t>
+              <a:t>4/16/2023</a:t>
             </a:fld>
             <a:endParaRPr lang="en-US"/>
           </a:p>
@@ -1969,7 +1972,7 @@
           <a:p>
             <a:fld id="{D46B952B-F692-4DD1-9678-FCDA40C3FC40}" type="datetimeFigureOut">
               <a:rPr lang="en-US" smtClean="0"/>
-              <a:t>4/9/2023</a:t>
+              <a:t>4/16/2023</a:t>
             </a:fld>
             <a:endParaRPr lang="en-US"/>
           </a:p>
@@ -2082,7 +2085,7 @@
           <a:p>
             <a:fld id="{D46B952B-F692-4DD1-9678-FCDA40C3FC40}" type="datetimeFigureOut">
               <a:rPr lang="en-US" smtClean="0"/>
-              <a:t>4/9/2023</a:t>
+              <a:t>4/16/2023</a:t>
             </a:fld>
             <a:endParaRPr lang="en-US"/>
           </a:p>
@@ -2393,7 +2396,7 @@
           <a:p>
             <a:fld id="{D46B952B-F692-4DD1-9678-FCDA40C3FC40}" type="datetimeFigureOut">
               <a:rPr lang="en-US" smtClean="0"/>
-              <a:t>4/9/2023</a:t>
+              <a:t>4/16/2023</a:t>
             </a:fld>
             <a:endParaRPr lang="en-US"/>
           </a:p>
@@ -2681,7 +2684,7 @@
           <a:p>
             <a:fld id="{D46B952B-F692-4DD1-9678-FCDA40C3FC40}" type="datetimeFigureOut">
               <a:rPr lang="en-US" smtClean="0"/>
-              <a:t>4/9/2023</a:t>
+              <a:t>4/16/2023</a:t>
             </a:fld>
             <a:endParaRPr lang="en-US"/>
           </a:p>
@@ -2931,7 +2934,7 @@
           <a:p>
             <a:fld id="{D46B952B-F692-4DD1-9678-FCDA40C3FC40}" type="datetimeFigureOut">
               <a:rPr lang="en-US" smtClean="0"/>
-              <a:t>4/9/2023</a:t>
+              <a:t>4/16/2023</a:t>
             </a:fld>
             <a:endParaRPr lang="en-US"/>
           </a:p>
@@ -3786,6 +3789,408 @@
           <p:cNvPr id="2" name="Title 1">
             <a:extLst>
               <a:ext uri="{FF2B5EF4-FFF2-40B4-BE49-F238E27FC236}">
+                <a16:creationId xmlns:a16="http://schemas.microsoft.com/office/drawing/2014/main" id="{7C41B1A6-3838-2599-DA29-5C960322A8A7}"/>
+              </a:ext>
+            </a:extLst>
+          </p:cNvPr>
+          <p:cNvSpPr>
+            <a:spLocks noGrp="1"/>
+          </p:cNvSpPr>
+          <p:nvPr>
+            <p:ph type="title"/>
+          </p:nvPr>
+        </p:nvSpPr>
+        <p:spPr/>
+        <p:txBody>
+          <a:bodyPr/>
+          <a:lstStyle/>
+          <a:p>
+            <a:endParaRPr lang="en-US"/>
+          </a:p>
+        </p:txBody>
+      </p:sp>
+      <p:sp>
+        <p:nvSpPr>
+          <p:cNvPr id="3" name="Content Placeholder 2">
+            <a:extLst>
+              <a:ext uri="{FF2B5EF4-FFF2-40B4-BE49-F238E27FC236}">
+                <a16:creationId xmlns:a16="http://schemas.microsoft.com/office/drawing/2014/main" id="{D52181EC-D3DF-BF4E-9AD8-EB19919C9350}"/>
+              </a:ext>
+            </a:extLst>
+          </p:cNvPr>
+          <p:cNvSpPr>
+            <a:spLocks noGrp="1"/>
+          </p:cNvSpPr>
+          <p:nvPr>
+            <p:ph idx="1"/>
+          </p:nvPr>
+        </p:nvSpPr>
+        <p:spPr/>
+        <p:txBody>
+          <a:bodyPr>
+            <a:normAutofit/>
+          </a:bodyPr>
+          <a:lstStyle/>
+          <a:p>
+            <a:pPr marL="0" indent="0">
+              <a:buNone/>
+            </a:pPr>
+            <a:r>
+              <a:rPr lang="en-US" sz="1800" b="0" dirty="0">
+                <a:solidFill>
+                  <a:srgbClr val="DCDCAA"/>
+                </a:solidFill>
+                <a:effectLst/>
+                <a:latin typeface="Consolas" panose="020B0609020204030204" pitchFamily="49" charset="0"/>
+              </a:rPr>
+              <a:t>NAME                                    READY    STATUS     RESTARTS    AGE</a:t>
+            </a:r>
+          </a:p>
+          <a:p>
+            <a:pPr marL="0" indent="0">
+              <a:buNone/>
+            </a:pPr>
+            <a:r>
+              <a:rPr lang="en-US" sz="1800" b="0" dirty="0">
+                <a:solidFill>
+                  <a:srgbClr val="DCDCAA"/>
+                </a:solidFill>
+                <a:effectLst/>
+                <a:latin typeface="Consolas" panose="020B0609020204030204" pitchFamily="49" charset="0"/>
+              </a:rPr>
+              <a:t>database-deployment-194a92db12-b2aat    1/1      Running    0           10d</a:t>
+            </a:r>
+          </a:p>
+          <a:p>
+            <a:pPr marL="0" indent="0">
+              <a:buNone/>
+            </a:pPr>
+            <a:r>
+              <a:rPr lang="en-US" sz="1800" b="0" dirty="0">
+                <a:solidFill>
+                  <a:srgbClr val="DCDCAA"/>
+                </a:solidFill>
+                <a:effectLst/>
+                <a:latin typeface="Consolas" panose="020B0609020204030204" pitchFamily="49" charset="0"/>
+              </a:rPr>
+              <a:t>web-deployment-98ad9380dd-8brg3         1/1      Running    0           2d7h</a:t>
+            </a:r>
+          </a:p>
+          <a:p>
+            <a:pPr marL="0" indent="0">
+              <a:buNone/>
+            </a:pPr>
+            <a:endParaRPr lang="en-US" sz="1800" b="0" dirty="0">
+              <a:solidFill>
+                <a:srgbClr val="DCDCAA"/>
+              </a:solidFill>
+              <a:effectLst/>
+              <a:latin typeface="Consolas" panose="020B0609020204030204" pitchFamily="49" charset="0"/>
+            </a:endParaRPr>
+          </a:p>
+        </p:txBody>
+      </p:sp>
+    </p:spTree>
+    <p:extLst>
+      <p:ext uri="{BB962C8B-B14F-4D97-AF65-F5344CB8AC3E}">
+        <p14:creationId xmlns:p14="http://schemas.microsoft.com/office/powerpoint/2010/main" val="3041112926"/>
+      </p:ext>
+    </p:extLst>
+  </p:cSld>
+  <p:clrMapOvr>
+    <a:masterClrMapping/>
+  </p:clrMapOvr>
+</p:sld>
+</file>
+
+<file path=ppt/slides/slide14.xml><?xml version="1.0" encoding="utf-8"?>
+<p:sld xmlns:a="http://schemas.openxmlformats.org/drawingml/2006/main" xmlns:r="http://schemas.openxmlformats.org/officeDocument/2006/relationships" xmlns:p="http://schemas.openxmlformats.org/presentationml/2006/main">
+  <p:cSld>
+    <p:spTree>
+      <p:nvGrpSpPr>
+        <p:cNvPr id="1" name=""/>
+        <p:cNvGrpSpPr/>
+        <p:nvPr/>
+      </p:nvGrpSpPr>
+      <p:grpSpPr>
+        <a:xfrm>
+          <a:off x="0" y="0"/>
+          <a:ext cx="0" cy="0"/>
+          <a:chOff x="0" y="0"/>
+          <a:chExt cx="0" cy="0"/>
+        </a:xfrm>
+      </p:grpSpPr>
+      <p:sp>
+        <p:nvSpPr>
+          <p:cNvPr id="2" name="Title 1">
+            <a:extLst>
+              <a:ext uri="{FF2B5EF4-FFF2-40B4-BE49-F238E27FC236}">
+                <a16:creationId xmlns:a16="http://schemas.microsoft.com/office/drawing/2014/main" id="{95A3076D-2FCC-1139-F41E-F86016494223}"/>
+              </a:ext>
+            </a:extLst>
+          </p:cNvPr>
+          <p:cNvSpPr>
+            <a:spLocks noGrp="1"/>
+          </p:cNvSpPr>
+          <p:nvPr>
+            <p:ph type="title"/>
+          </p:nvPr>
+        </p:nvSpPr>
+        <p:spPr/>
+        <p:txBody>
+          <a:bodyPr/>
+          <a:lstStyle/>
+          <a:p>
+            <a:endParaRPr lang="en-US"/>
+          </a:p>
+        </p:txBody>
+      </p:sp>
+      <p:sp>
+        <p:nvSpPr>
+          <p:cNvPr id="3" name="Content Placeholder 2">
+            <a:extLst>
+              <a:ext uri="{FF2B5EF4-FFF2-40B4-BE49-F238E27FC236}">
+                <a16:creationId xmlns:a16="http://schemas.microsoft.com/office/drawing/2014/main" id="{3BCDE2E0-FF2E-A0F6-15E3-62F78BE16F36}"/>
+              </a:ext>
+            </a:extLst>
+          </p:cNvPr>
+          <p:cNvSpPr>
+            <a:spLocks noGrp="1"/>
+          </p:cNvSpPr>
+          <p:nvPr>
+            <p:ph idx="1"/>
+          </p:nvPr>
+        </p:nvSpPr>
+        <p:spPr/>
+        <p:txBody>
+          <a:bodyPr>
+            <a:normAutofit/>
+          </a:bodyPr>
+          <a:lstStyle/>
+          <a:p>
+            <a:pPr marL="0" indent="0">
+              <a:buNone/>
+            </a:pPr>
+            <a:r>
+              <a:rPr lang="en-US" sz="1800" b="0" dirty="0">
+                <a:solidFill>
+                  <a:srgbClr val="DCDCAA"/>
+                </a:solidFill>
+                <a:effectLst/>
+                <a:latin typeface="Consolas" panose="020B0609020204030204" pitchFamily="49" charset="0"/>
+              </a:rPr>
+              <a:t>NAME                                    ;READY    ;STATUS     ;RESTARTS    ;AGE</a:t>
+            </a:r>
+          </a:p>
+          <a:p>
+            <a:pPr marL="0" indent="0">
+              <a:buNone/>
+            </a:pPr>
+            <a:r>
+              <a:rPr lang="en-US" sz="1800" b="0" dirty="0">
+                <a:solidFill>
+                  <a:srgbClr val="DCDCAA"/>
+                </a:solidFill>
+                <a:effectLst/>
+                <a:latin typeface="Consolas" panose="020B0609020204030204" pitchFamily="49" charset="0"/>
+              </a:rPr>
+              <a:t>database-deployment-194a92db12-b2aat    ;1/1      ;Running    ;0           ;10d</a:t>
+            </a:r>
+          </a:p>
+          <a:p>
+            <a:pPr marL="0" indent="0">
+              <a:buNone/>
+            </a:pPr>
+            <a:r>
+              <a:rPr lang="en-US" sz="1800" b="0" dirty="0">
+                <a:solidFill>
+                  <a:srgbClr val="DCDCAA"/>
+                </a:solidFill>
+                <a:effectLst/>
+                <a:latin typeface="Consolas" panose="020B0609020204030204" pitchFamily="49" charset="0"/>
+              </a:rPr>
+              <a:t>web-deployment-98ad9380dd-8brg3         ;1/1      ;Running    ;0           ;2d7h</a:t>
+            </a:r>
+          </a:p>
+          <a:p>
+            <a:pPr marL="0" indent="0">
+              <a:buNone/>
+            </a:pPr>
+            <a:endParaRPr lang="en-US" sz="1800" b="0" dirty="0">
+              <a:solidFill>
+                <a:srgbClr val="DCDCAA"/>
+              </a:solidFill>
+              <a:effectLst/>
+              <a:latin typeface="Consolas" panose="020B0609020204030204" pitchFamily="49" charset="0"/>
+            </a:endParaRPr>
+          </a:p>
+          <a:p>
+            <a:pPr marL="0" indent="0">
+              <a:buNone/>
+            </a:pPr>
+            <a:endParaRPr lang="en-US" sz="1800" dirty="0"/>
+          </a:p>
+        </p:txBody>
+      </p:sp>
+    </p:spTree>
+    <p:extLst>
+      <p:ext uri="{BB962C8B-B14F-4D97-AF65-F5344CB8AC3E}">
+        <p14:creationId xmlns:p14="http://schemas.microsoft.com/office/powerpoint/2010/main" val="3690496117"/>
+      </p:ext>
+    </p:extLst>
+  </p:cSld>
+  <p:clrMapOvr>
+    <a:masterClrMapping/>
+  </p:clrMapOvr>
+</p:sld>
+</file>
+
+<file path=ppt/slides/slide15.xml><?xml version="1.0" encoding="utf-8"?>
+<p:sld xmlns:a="http://schemas.openxmlformats.org/drawingml/2006/main" xmlns:r="http://schemas.openxmlformats.org/officeDocument/2006/relationships" xmlns:p="http://schemas.openxmlformats.org/presentationml/2006/main">
+  <p:cSld>
+    <p:spTree>
+      <p:nvGrpSpPr>
+        <p:cNvPr id="1" name=""/>
+        <p:cNvGrpSpPr/>
+        <p:nvPr/>
+      </p:nvGrpSpPr>
+      <p:grpSpPr>
+        <a:xfrm>
+          <a:off x="0" y="0"/>
+          <a:ext cx="0" cy="0"/>
+          <a:chOff x="0" y="0"/>
+          <a:chExt cx="0" cy="0"/>
+        </a:xfrm>
+      </p:grpSpPr>
+      <p:sp>
+        <p:nvSpPr>
+          <p:cNvPr id="2" name="Title 1">
+            <a:extLst>
+              <a:ext uri="{FF2B5EF4-FFF2-40B4-BE49-F238E27FC236}">
+                <a16:creationId xmlns:a16="http://schemas.microsoft.com/office/drawing/2014/main" id="{1F6C0191-2D49-EA2B-4EDD-2A9259BA9784}"/>
+              </a:ext>
+            </a:extLst>
+          </p:cNvPr>
+          <p:cNvSpPr>
+            <a:spLocks noGrp="1"/>
+          </p:cNvSpPr>
+          <p:nvPr>
+            <p:ph type="title"/>
+          </p:nvPr>
+        </p:nvSpPr>
+        <p:spPr/>
+        <p:txBody>
+          <a:bodyPr/>
+          <a:lstStyle/>
+          <a:p>
+            <a:endParaRPr lang="en-US"/>
+          </a:p>
+        </p:txBody>
+      </p:sp>
+      <p:sp>
+        <p:nvSpPr>
+          <p:cNvPr id="3" name="Content Placeholder 2">
+            <a:extLst>
+              <a:ext uri="{FF2B5EF4-FFF2-40B4-BE49-F238E27FC236}">
+                <a16:creationId xmlns:a16="http://schemas.microsoft.com/office/drawing/2014/main" id="{3D8CFCC2-45B3-1A1F-0C61-5E2409CA827D}"/>
+              </a:ext>
+            </a:extLst>
+          </p:cNvPr>
+          <p:cNvSpPr>
+            <a:spLocks noGrp="1"/>
+          </p:cNvSpPr>
+          <p:nvPr>
+            <p:ph idx="1"/>
+          </p:nvPr>
+        </p:nvSpPr>
+        <p:spPr/>
+        <p:txBody>
+          <a:bodyPr>
+            <a:normAutofit/>
+          </a:bodyPr>
+          <a:lstStyle/>
+          <a:p>
+            <a:pPr marL="0" indent="0">
+              <a:buNone/>
+            </a:pPr>
+            <a:r>
+              <a:rPr lang="en-US" sz="1800" b="0" dirty="0">
+                <a:solidFill>
+                  <a:srgbClr val="DCDCAA"/>
+                </a:solidFill>
+                <a:effectLst/>
+                <a:latin typeface="Consolas" panose="020B0609020204030204" pitchFamily="49" charset="0"/>
+              </a:rPr>
+              <a:t>NAME;READY;STATUS;RESTARTS;AGE</a:t>
+            </a:r>
+          </a:p>
+          <a:p>
+            <a:pPr marL="0" indent="0">
+              <a:buNone/>
+            </a:pPr>
+            <a:r>
+              <a:rPr lang="en-US" sz="1800" b="0" dirty="0">
+                <a:solidFill>
+                  <a:srgbClr val="DCDCAA"/>
+                </a:solidFill>
+                <a:effectLst/>
+                <a:latin typeface="Consolas" panose="020B0609020204030204" pitchFamily="49" charset="0"/>
+              </a:rPr>
+              <a:t>database-deployment-194a92db12-b2aat;1/1;Running;0;10d</a:t>
+            </a:r>
+          </a:p>
+          <a:p>
+            <a:pPr marL="0" indent="0">
+              <a:buNone/>
+            </a:pPr>
+            <a:r>
+              <a:rPr lang="en-US" sz="1800" b="0" dirty="0">
+                <a:solidFill>
+                  <a:srgbClr val="DCDCAA"/>
+                </a:solidFill>
+                <a:effectLst/>
+                <a:latin typeface="Consolas" panose="020B0609020204030204" pitchFamily="49" charset="0"/>
+              </a:rPr>
+              <a:t>web-deployment-98ad9380dd-8brg3;1/1;Running;0;2d7h</a:t>
+            </a:r>
+          </a:p>
+        </p:txBody>
+      </p:sp>
+    </p:spTree>
+    <p:extLst>
+      <p:ext uri="{BB962C8B-B14F-4D97-AF65-F5344CB8AC3E}">
+        <p14:creationId xmlns:p14="http://schemas.microsoft.com/office/powerpoint/2010/main" val="3793522919"/>
+      </p:ext>
+    </p:extLst>
+  </p:cSld>
+  <p:clrMapOvr>
+    <a:masterClrMapping/>
+  </p:clrMapOvr>
+</p:sld>
+</file>
+
+<file path=ppt/slides/slide16.xml><?xml version="1.0" encoding="utf-8"?>
+<p:sld xmlns:a="http://schemas.openxmlformats.org/drawingml/2006/main" xmlns:r="http://schemas.openxmlformats.org/officeDocument/2006/relationships" xmlns:p="http://schemas.openxmlformats.org/presentationml/2006/main">
+  <p:cSld>
+    <p:spTree>
+      <p:nvGrpSpPr>
+        <p:cNvPr id="1" name=""/>
+        <p:cNvGrpSpPr/>
+        <p:nvPr/>
+      </p:nvGrpSpPr>
+      <p:grpSpPr>
+        <a:xfrm>
+          <a:off x="0" y="0"/>
+          <a:ext cx="0" cy="0"/>
+          <a:chOff x="0" y="0"/>
+          <a:chExt cx="0" cy="0"/>
+        </a:xfrm>
+      </p:grpSpPr>
+      <p:sp>
+        <p:nvSpPr>
+          <p:cNvPr id="2" name="Title 1">
+            <a:extLst>
+              <a:ext uri="{FF2B5EF4-FFF2-40B4-BE49-F238E27FC236}">
                 <a16:creationId xmlns:a16="http://schemas.microsoft.com/office/drawing/2014/main" id="{C476805D-43D3-E6D0-4DE0-07F015C59E3F}"/>
               </a:ext>
             </a:extLst>
@@ -3847,7 +4252,7 @@
 </p:sld>
 </file>
 
-<file path=ppt/slides/slide14.xml><?xml version="1.0" encoding="utf-8"?>
+<file path=ppt/slides/slide17.xml><?xml version="1.0" encoding="utf-8"?>
 <p:sld xmlns:a="http://schemas.openxmlformats.org/drawingml/2006/main" xmlns:r="http://schemas.openxmlformats.org/officeDocument/2006/relationships" xmlns:p="http://schemas.openxmlformats.org/presentationml/2006/main">
   <p:cSld>
     <p:spTree>
@@ -4013,7 +4418,22 @@
             <a:pPr lvl="1"/>
             <a:r>
               <a:rPr lang="en-US" dirty="0"/>
-              <a:t>From Eugene, OR USA so I like to</a:t>
+              <a:t>From Eugene, OR USA so, according to </a:t>
+            </a:r>
+            <a:r>
+              <a:rPr lang="en-US" dirty="0" err="1"/>
+              <a:t>ChatGPT</a:t>
+            </a:r>
+            <a:r>
+              <a:rPr lang="en-US" dirty="0"/>
+              <a:t>, I am:</a:t>
+            </a:r>
+          </a:p>
+          <a:p>
+            <a:pPr lvl="2"/>
+            <a:r>
+              <a:rPr lang="en-US" dirty="0"/>
+              <a:t>Progressive, outdoorsy, creative, friendly, and open-minded</a:t>
             </a:r>
           </a:p>
           <a:p>
@@ -4027,7 +4447,7 @@
             <a:pPr lvl="1"/>
             <a:r>
               <a:rPr lang="en-US" dirty="0"/>
-              <a:t>In IT since 2012</a:t>
+              <a:t>In IT since 2011</a:t>
             </a:r>
           </a:p>
           <a:p>
@@ -4102,7 +4522,7 @@
             <a:pPr lvl="1"/>
             <a:r>
               <a:rPr lang="en-US" dirty="0"/>
-              <a:t>Employed</a:t>
+              <a:t>Employed (Cloud Platform Architect)</a:t>
             </a:r>
           </a:p>
         </p:txBody>
@@ -4117,88 +4537,6 @@
   <p:clrMapOvr>
     <a:masterClrMapping/>
   </p:clrMapOvr>
-  <p:timing>
-    <p:tnLst>
-      <p:par>
-        <p:cTn id="1" dur="indefinite" restart="never" nodeType="tmRoot">
-          <p:childTnLst>
-            <p:seq concurrent="1" nextAc="seek">
-              <p:cTn id="2" dur="indefinite" nodeType="mainSeq">
-                <p:childTnLst>
-                  <p:par>
-                    <p:cTn id="3" fill="hold">
-                      <p:stCondLst>
-                        <p:cond delay="indefinite"/>
-                      </p:stCondLst>
-                      <p:childTnLst>
-                        <p:par>
-                          <p:cTn id="4" fill="hold">
-                            <p:stCondLst>
-                              <p:cond delay="0"/>
-                            </p:stCondLst>
-                            <p:childTnLst>
-                              <p:par>
-                                <p:cTn id="5" presetID="1" presetClass="entr" presetSubtype="0" fill="hold" grpId="0" nodeType="clickEffect">
-                                  <p:stCondLst>
-                                    <p:cond delay="0"/>
-                                  </p:stCondLst>
-                                  <p:childTnLst>
-                                    <p:set>
-                                      <p:cBhvr>
-                                        <p:cTn id="6" dur="1" fill="hold">
-                                          <p:stCondLst>
-                                            <p:cond delay="0"/>
-                                          </p:stCondLst>
-                                        </p:cTn>
-                                        <p:tgtEl>
-                                          <p:spTgt spid="3">
-                                            <p:txEl>
-                                              <p:pRg st="0" end="0"/>
-                                            </p:txEl>
-                                          </p:spTgt>
-                                        </p:tgtEl>
-                                        <p:attrNameLst>
-                                          <p:attrName>style.visibility</p:attrName>
-                                        </p:attrNameLst>
-                                      </p:cBhvr>
-                                      <p:to>
-                                        <p:strVal val="visible"/>
-                                      </p:to>
-                                    </p:set>
-                                  </p:childTnLst>
-                                </p:cTn>
-                              </p:par>
-                            </p:childTnLst>
-                          </p:cTn>
-                        </p:par>
-                      </p:childTnLst>
-                    </p:cTn>
-                  </p:par>
-                </p:childTnLst>
-              </p:cTn>
-              <p:prevCondLst>
-                <p:cond evt="onPrev" delay="0">
-                  <p:tgtEl>
-                    <p:sldTgt/>
-                  </p:tgtEl>
-                </p:cond>
-              </p:prevCondLst>
-              <p:nextCondLst>
-                <p:cond evt="onNext" delay="0">
-                  <p:tgtEl>
-                    <p:sldTgt/>
-                  </p:tgtEl>
-                </p:cond>
-              </p:nextCondLst>
-            </p:seq>
-          </p:childTnLst>
-        </p:cTn>
-      </p:par>
-    </p:tnLst>
-    <p:bldLst>
-      <p:bldP spid="3" grpId="0" build="p"/>
-    </p:bldLst>
-  </p:timing>
 </p:sld>
 </file>
 
@@ -4750,7 +5088,17 @@
             </a:r>
             <a:r>
               <a:rPr lang="en-US" dirty="0"/>
-              <a:t> output while preserving syntax</a:t>
+              <a:t> output</a:t>
+            </a:r>
+          </a:p>
+          <a:p>
+            <a:pPr marL="514350" indent="-514350">
+              <a:buFont typeface="+mj-lt"/>
+              <a:buAutoNum type="arabicPeriod"/>
+            </a:pPr>
+            <a:r>
+              <a:rPr lang="en-US" dirty="0"/>
+              <a:t>Preserve syntax</a:t>
             </a:r>
           </a:p>
           <a:p>

</xml_diff>

<commit_message>
improving words, adding meme
</commit_message>
<xml_diff>
--- a/2023-04-27 - Making Kubectl PowerShell friendly/PowerShell Summit 2023 - Making Kubectl PowerShell friendly.pptx
+++ b/2023-04-27 - Making Kubectl PowerShell friendly/PowerShell Summit 2023 - Making Kubectl PowerShell friendly.pptx
@@ -8,9 +8,9 @@
     <p:sldId id="256" r:id="rId2"/>
     <p:sldId id="257" r:id="rId3"/>
     <p:sldId id="272" r:id="rId4"/>
-    <p:sldId id="273" r:id="rId5"/>
-    <p:sldId id="274" r:id="rId6"/>
-    <p:sldId id="275" r:id="rId7"/>
+    <p:sldId id="274" r:id="rId5"/>
+    <p:sldId id="275" r:id="rId6"/>
+    <p:sldId id="286" r:id="rId7"/>
     <p:sldId id="277" r:id="rId8"/>
     <p:sldId id="276" r:id="rId9"/>
     <p:sldId id="271" r:id="rId10"/>
@@ -22,6 +22,7 @@
     <p:sldId id="284" r:id="rId16"/>
     <p:sldId id="279" r:id="rId17"/>
     <p:sldId id="280" r:id="rId18"/>
+    <p:sldId id="287" r:id="rId19"/>
   </p:sldIdLst>
   <p:sldSz cx="12192000" cy="6858000"/>
   <p:notesSz cx="6858000" cy="9144000"/>
@@ -275,7 +276,7 @@
           <a:p>
             <a:fld id="{D46B952B-F692-4DD1-9678-FCDA40C3FC40}" type="datetimeFigureOut">
               <a:rPr lang="en-US" smtClean="0"/>
-              <a:t>4/16/2023</a:t>
+              <a:t>4/20/2023</a:t>
             </a:fld>
             <a:endParaRPr lang="en-US"/>
           </a:p>
@@ -473,7 +474,7 @@
           <a:p>
             <a:fld id="{D46B952B-F692-4DD1-9678-FCDA40C3FC40}" type="datetimeFigureOut">
               <a:rPr lang="en-US" smtClean="0"/>
-              <a:t>4/16/2023</a:t>
+              <a:t>4/20/2023</a:t>
             </a:fld>
             <a:endParaRPr lang="en-US"/>
           </a:p>
@@ -681,7 +682,7 @@
           <a:p>
             <a:fld id="{D46B952B-F692-4DD1-9678-FCDA40C3FC40}" type="datetimeFigureOut">
               <a:rPr lang="en-US" smtClean="0"/>
-              <a:t>4/16/2023</a:t>
+              <a:t>4/20/2023</a:t>
             </a:fld>
             <a:endParaRPr lang="en-US"/>
           </a:p>
@@ -879,7 +880,7 @@
           <a:p>
             <a:fld id="{D46B952B-F692-4DD1-9678-FCDA40C3FC40}" type="datetimeFigureOut">
               <a:rPr lang="en-US" smtClean="0"/>
-              <a:t>4/16/2023</a:t>
+              <a:t>4/20/2023</a:t>
             </a:fld>
             <a:endParaRPr lang="en-US"/>
           </a:p>
@@ -1154,7 +1155,7 @@
           <a:p>
             <a:fld id="{D46B952B-F692-4DD1-9678-FCDA40C3FC40}" type="datetimeFigureOut">
               <a:rPr lang="en-US" smtClean="0"/>
-              <a:t>4/16/2023</a:t>
+              <a:t>4/20/2023</a:t>
             </a:fld>
             <a:endParaRPr lang="en-US"/>
           </a:p>
@@ -1419,7 +1420,7 @@
           <a:p>
             <a:fld id="{D46B952B-F692-4DD1-9678-FCDA40C3FC40}" type="datetimeFigureOut">
               <a:rPr lang="en-US" smtClean="0"/>
-              <a:t>4/16/2023</a:t>
+              <a:t>4/20/2023</a:t>
             </a:fld>
             <a:endParaRPr lang="en-US"/>
           </a:p>
@@ -1831,7 +1832,7 @@
           <a:p>
             <a:fld id="{D46B952B-F692-4DD1-9678-FCDA40C3FC40}" type="datetimeFigureOut">
               <a:rPr lang="en-US" smtClean="0"/>
-              <a:t>4/16/2023</a:t>
+              <a:t>4/20/2023</a:t>
             </a:fld>
             <a:endParaRPr lang="en-US"/>
           </a:p>
@@ -1972,7 +1973,7 @@
           <a:p>
             <a:fld id="{D46B952B-F692-4DD1-9678-FCDA40C3FC40}" type="datetimeFigureOut">
               <a:rPr lang="en-US" smtClean="0"/>
-              <a:t>4/16/2023</a:t>
+              <a:t>4/20/2023</a:t>
             </a:fld>
             <a:endParaRPr lang="en-US"/>
           </a:p>
@@ -2085,7 +2086,7 @@
           <a:p>
             <a:fld id="{D46B952B-F692-4DD1-9678-FCDA40C3FC40}" type="datetimeFigureOut">
               <a:rPr lang="en-US" smtClean="0"/>
-              <a:t>4/16/2023</a:t>
+              <a:t>4/20/2023</a:t>
             </a:fld>
             <a:endParaRPr lang="en-US"/>
           </a:p>
@@ -2396,7 +2397,7 @@
           <a:p>
             <a:fld id="{D46B952B-F692-4DD1-9678-FCDA40C3FC40}" type="datetimeFigureOut">
               <a:rPr lang="en-US" smtClean="0"/>
-              <a:t>4/16/2023</a:t>
+              <a:t>4/20/2023</a:t>
             </a:fld>
             <a:endParaRPr lang="en-US"/>
           </a:p>
@@ -2684,7 +2685,7 @@
           <a:p>
             <a:fld id="{D46B952B-F692-4DD1-9678-FCDA40C3FC40}" type="datetimeFigureOut">
               <a:rPr lang="en-US" smtClean="0"/>
-              <a:t>4/16/2023</a:t>
+              <a:t>4/20/2023</a:t>
             </a:fld>
             <a:endParaRPr lang="en-US"/>
           </a:p>
@@ -2934,7 +2935,7 @@
           <a:p>
             <a:fld id="{D46B952B-F692-4DD1-9678-FCDA40C3FC40}" type="datetimeFigureOut">
               <a:rPr lang="en-US" smtClean="0"/>
-              <a:t>4/16/2023</a:t>
+              <a:t>4/20/2023</a:t>
             </a:fld>
             <a:endParaRPr lang="en-US"/>
           </a:p>
@@ -4335,6 +4336,102 @@
 </p:sld>
 </file>
 
+<file path=ppt/slides/slide18.xml><?xml version="1.0" encoding="utf-8"?>
+<p:sld xmlns:a="http://schemas.openxmlformats.org/drawingml/2006/main" xmlns:r="http://schemas.openxmlformats.org/officeDocument/2006/relationships" xmlns:p="http://schemas.openxmlformats.org/presentationml/2006/main">
+  <p:cSld>
+    <p:spTree>
+      <p:nvGrpSpPr>
+        <p:cNvPr id="1" name=""/>
+        <p:cNvGrpSpPr/>
+        <p:nvPr/>
+      </p:nvGrpSpPr>
+      <p:grpSpPr>
+        <a:xfrm>
+          <a:off x="0" y="0"/>
+          <a:ext cx="0" cy="0"/>
+          <a:chOff x="0" y="0"/>
+          <a:chExt cx="0" cy="0"/>
+        </a:xfrm>
+      </p:grpSpPr>
+      <p:sp>
+        <p:nvSpPr>
+          <p:cNvPr id="2" name="Title 1">
+            <a:extLst>
+              <a:ext uri="{FF2B5EF4-FFF2-40B4-BE49-F238E27FC236}">
+                <a16:creationId xmlns:a16="http://schemas.microsoft.com/office/drawing/2014/main" id="{AC6565B9-FFBB-707F-C7AE-4F39D075A418}"/>
+              </a:ext>
+            </a:extLst>
+          </p:cNvPr>
+          <p:cNvSpPr>
+            <a:spLocks noGrp="1"/>
+          </p:cNvSpPr>
+          <p:nvPr>
+            <p:ph type="title"/>
+          </p:nvPr>
+        </p:nvSpPr>
+        <p:spPr/>
+        <p:txBody>
+          <a:bodyPr/>
+          <a:lstStyle/>
+          <a:p>
+            <a:r>
+              <a:rPr lang="en-US" dirty="0"/>
+              <a:t>github.com/</a:t>
+            </a:r>
+            <a:r>
+              <a:rPr lang="en-US" dirty="0" err="1"/>
+              <a:t>theposhwolf</a:t>
+            </a:r>
+            <a:r>
+              <a:rPr lang="en-US" dirty="0"/>
+              <a:t>/</a:t>
+            </a:r>
+            <a:r>
+              <a:rPr lang="en-US" dirty="0" err="1"/>
+              <a:t>specialk</a:t>
+            </a:r>
+            <a:endParaRPr lang="en-US" dirty="0"/>
+          </a:p>
+        </p:txBody>
+      </p:sp>
+      <p:sp>
+        <p:nvSpPr>
+          <p:cNvPr id="3" name="Text Placeholder 2">
+            <a:extLst>
+              <a:ext uri="{FF2B5EF4-FFF2-40B4-BE49-F238E27FC236}">
+                <a16:creationId xmlns:a16="http://schemas.microsoft.com/office/drawing/2014/main" id="{98207736-1827-F614-ECCB-F2480323BC3F}"/>
+              </a:ext>
+            </a:extLst>
+          </p:cNvPr>
+          <p:cNvSpPr>
+            <a:spLocks noGrp="1"/>
+          </p:cNvSpPr>
+          <p:nvPr>
+            <p:ph type="body" idx="1"/>
+          </p:nvPr>
+        </p:nvSpPr>
+        <p:spPr/>
+        <p:txBody>
+          <a:bodyPr/>
+          <a:lstStyle/>
+          <a:p>
+            <a:endParaRPr lang="en-US" dirty="0"/>
+          </a:p>
+        </p:txBody>
+      </p:sp>
+    </p:spTree>
+    <p:extLst>
+      <p:ext uri="{BB962C8B-B14F-4D97-AF65-F5344CB8AC3E}">
+        <p14:creationId xmlns:p14="http://schemas.microsoft.com/office/powerpoint/2010/main" val="1745488600"/>
+      </p:ext>
+    </p:extLst>
+  </p:cSld>
+  <p:clrMapOvr>
+    <a:masterClrMapping/>
+  </p:clrMapOvr>
+</p:sld>
+</file>
+
 <file path=ppt/slides/slide2.xml><?xml version="1.0" encoding="utf-8"?>
 <p:sld xmlns:a="http://schemas.openxmlformats.org/drawingml/2006/main" xmlns:r="http://schemas.openxmlformats.org/officeDocument/2006/relationships" xmlns:p="http://schemas.openxmlformats.org/presentationml/2006/main">
   <p:cSld>
@@ -4628,21 +4725,19 @@
           <a:p>
             <a:r>
               <a:rPr lang="en-US" dirty="0"/>
-              <a:t>Technical solution</a:t>
-            </a:r>
-          </a:p>
-          <a:p>
-            <a:pPr lvl="1"/>
-            <a:r>
-              <a:rPr lang="en-US" dirty="0"/>
-              <a:t>Parsing output</a:t>
-            </a:r>
-          </a:p>
-          <a:p>
-            <a:pPr lvl="1"/>
-            <a:r>
-              <a:rPr lang="en-US" dirty="0"/>
-              <a:t>Generating PowerShell formats</a:t>
+              <a:t>Technical solution - Parsing output</a:t>
+            </a:r>
+          </a:p>
+          <a:p>
+            <a:r>
+              <a:rPr lang="en-US" dirty="0"/>
+              <a:t>Gotchas</a:t>
+            </a:r>
+          </a:p>
+          <a:p>
+            <a:r>
+              <a:rPr lang="en-US" dirty="0"/>
+              <a:t>Technical solution - Generating PowerShell formats</a:t>
             </a:r>
           </a:p>
           <a:p>
@@ -4688,7 +4783,7 @@
           <p:cNvPr id="2" name="Title 1">
             <a:extLst>
               <a:ext uri="{FF2B5EF4-FFF2-40B4-BE49-F238E27FC236}">
-                <a16:creationId xmlns:a16="http://schemas.microsoft.com/office/drawing/2014/main" id="{E57020CE-8FBE-281A-B2F7-6C2265E2F6AB}"/>
+                <a16:creationId xmlns:a16="http://schemas.microsoft.com/office/drawing/2014/main" id="{A87E3C25-7C8C-0DF3-B75F-24DCA785DFAA}"/>
               </a:ext>
             </a:extLst>
           </p:cNvPr>
@@ -4706,40 +4801,55 @@
           <a:p>
             <a:r>
               <a:rPr lang="en-US" dirty="0"/>
-              <a:t>CAUTION: Opinion ahead</a:t>
-            </a:r>
-          </a:p>
-        </p:txBody>
-      </p:sp>
-      <p:sp>
-        <p:nvSpPr>
-          <p:cNvPr id="3" name="Text Placeholder 2">
-            <a:extLst>
-              <a:ext uri="{FF2B5EF4-FFF2-40B4-BE49-F238E27FC236}">
-                <a16:creationId xmlns:a16="http://schemas.microsoft.com/office/drawing/2014/main" id="{51546B94-BED6-8140-69A5-6134CBA6B2D6}"/>
-              </a:ext>
-            </a:extLst>
-          </p:cNvPr>
-          <p:cNvSpPr>
-            <a:spLocks noGrp="1"/>
-          </p:cNvSpPr>
-          <p:nvPr>
-            <p:ph type="body" idx="1"/>
-          </p:nvPr>
-        </p:nvSpPr>
-        <p:spPr/>
-        <p:txBody>
-          <a:bodyPr/>
-          <a:lstStyle/>
-          <a:p>
-            <a:endParaRPr lang="en-US"/>
+              <a:t>The Problem</a:t>
+            </a:r>
+          </a:p>
+        </p:txBody>
+      </p:sp>
+      <p:sp>
+        <p:nvSpPr>
+          <p:cNvPr id="3" name="Content Placeholder 2">
+            <a:extLst>
+              <a:ext uri="{FF2B5EF4-FFF2-40B4-BE49-F238E27FC236}">
+                <a16:creationId xmlns:a16="http://schemas.microsoft.com/office/drawing/2014/main" id="{69A2A13C-0AAF-7AAC-9BE2-DD80D096953D}"/>
+              </a:ext>
+            </a:extLst>
+          </p:cNvPr>
+          <p:cNvSpPr>
+            <a:spLocks noGrp="1"/>
+          </p:cNvSpPr>
+          <p:nvPr>
+            <p:ph idx="1"/>
+          </p:nvPr>
+        </p:nvSpPr>
+        <p:spPr/>
+        <p:txBody>
+          <a:bodyPr/>
+          <a:lstStyle/>
+          <a:p>
+            <a:r>
+              <a:rPr lang="en-US" dirty="0" err="1"/>
+              <a:t>Kubectl</a:t>
+            </a:r>
+            <a:r>
+              <a:rPr lang="en-US" dirty="0"/>
+              <a:t> is just </a:t>
+            </a:r>
+            <a:r>
+              <a:rPr lang="en-US" dirty="0" err="1"/>
+              <a:t>stdout</a:t>
+            </a:r>
+            <a:endParaRPr lang="en-US" dirty="0"/>
+          </a:p>
+          <a:p>
+            <a:endParaRPr lang="en-US" dirty="0"/>
           </a:p>
         </p:txBody>
       </p:sp>
     </p:spTree>
     <p:extLst>
       <p:ext uri="{BB962C8B-B14F-4D97-AF65-F5344CB8AC3E}">
-        <p14:creationId xmlns:p14="http://schemas.microsoft.com/office/powerpoint/2010/main" val="2184799276"/>
+        <p14:creationId xmlns:p14="http://schemas.microsoft.com/office/powerpoint/2010/main" val="1665671459"/>
       </p:ext>
     </p:extLst>
   </p:cSld>
@@ -4771,7 +4881,7 @@
           <p:cNvPr id="2" name="Title 1">
             <a:extLst>
               <a:ext uri="{FF2B5EF4-FFF2-40B4-BE49-F238E27FC236}">
-                <a16:creationId xmlns:a16="http://schemas.microsoft.com/office/drawing/2014/main" id="{A87E3C25-7C8C-0DF3-B75F-24DCA785DFAA}"/>
+                <a16:creationId xmlns:a16="http://schemas.microsoft.com/office/drawing/2014/main" id="{55B31744-ED95-32F9-D88F-27B03B231DE0}"/>
               </a:ext>
             </a:extLst>
           </p:cNvPr>
@@ -4789,7 +4899,15 @@
           <a:p>
             <a:r>
               <a:rPr lang="en-US" dirty="0"/>
-              <a:t>The Problem</a:t>
+              <a:t>Crescendo or -o </a:t>
+            </a:r>
+            <a:r>
+              <a:rPr lang="en-US" dirty="0" err="1"/>
+              <a:t>json</a:t>
+            </a:r>
+            <a:r>
+              <a:rPr lang="en-US" dirty="0"/>
+              <a:t>?</a:t>
             </a:r>
           </a:p>
         </p:txBody>
@@ -4799,7 +4917,7 @@
           <p:cNvPr id="3" name="Content Placeholder 2">
             <a:extLst>
               <a:ext uri="{FF2B5EF4-FFF2-40B4-BE49-F238E27FC236}">
-                <a16:creationId xmlns:a16="http://schemas.microsoft.com/office/drawing/2014/main" id="{69A2A13C-0AAF-7AAC-9BE2-DD80D096953D}"/>
+                <a16:creationId xmlns:a16="http://schemas.microsoft.com/office/drawing/2014/main" id="{22AB60D4-7F39-36CB-F888-35C18D054A28}"/>
               </a:ext>
             </a:extLst>
           </p:cNvPr>
@@ -4816,20 +4934,75 @@
           <a:lstStyle/>
           <a:p>
             <a:r>
+              <a:rPr lang="en-US" dirty="0"/>
+              <a:t>Crescendo</a:t>
+            </a:r>
+          </a:p>
+          <a:p>
+            <a:pPr lvl="1"/>
+            <a:r>
+              <a:rPr lang="en-US" dirty="0"/>
+              <a:t>Definitely more PowerShell-y (verb-noun)</a:t>
+            </a:r>
+          </a:p>
+          <a:p>
+            <a:pPr lvl="1"/>
+            <a:r>
+              <a:rPr lang="en-US" dirty="0"/>
+              <a:t>Not cross-shell compatible</a:t>
+            </a:r>
+          </a:p>
+          <a:p>
+            <a:pPr lvl="1"/>
+            <a:r>
+              <a:rPr lang="en-US" dirty="0"/>
+              <a:t>Not a bad tool, just not the right tool for the job</a:t>
+            </a:r>
+          </a:p>
+          <a:p>
+            <a:r>
               <a:rPr lang="en-US" dirty="0" err="1"/>
-              <a:t>Kubectl</a:t>
-            </a:r>
-            <a:r>
-              <a:rPr lang="en-US" dirty="0"/>
-              <a:t> is just </a:t>
+              <a:t>kubectl</a:t>
+            </a:r>
+            <a:r>
+              <a:rPr lang="en-US" dirty="0"/>
+              <a:t> get pod -o </a:t>
             </a:r>
             <a:r>
               <a:rPr lang="en-US" dirty="0" err="1"/>
-              <a:t>stdout</a:t>
+              <a:t>json</a:t>
+            </a:r>
+            <a:r>
+              <a:rPr lang="en-US" dirty="0"/>
+              <a:t> | </a:t>
+            </a:r>
+            <a:r>
+              <a:rPr lang="en-US" dirty="0" err="1"/>
+              <a:t>ConvertFrom-Json</a:t>
             </a:r>
             <a:endParaRPr lang="en-US" dirty="0"/>
           </a:p>
           <a:p>
+            <a:pPr lvl="1"/>
+            <a:r>
+              <a:rPr lang="en-US" dirty="0"/>
+              <a:t>Too much typing</a:t>
+            </a:r>
+          </a:p>
+          <a:p>
+            <a:pPr lvl="1"/>
+            <a:r>
+              <a:rPr lang="en-US" dirty="0"/>
+              <a:t>Too much data</a:t>
+            </a:r>
+            <a:r>
+              <a:rPr lang="en-US"/>
+              <a:t>, usually</a:t>
+            </a:r>
+            <a:endParaRPr lang="en-US" dirty="0"/>
+          </a:p>
+          <a:p>
+            <a:pPr lvl="1"/>
             <a:endParaRPr lang="en-US" dirty="0"/>
           </a:p>
         </p:txBody>
@@ -4837,7 +5010,7 @@
     </p:spTree>
     <p:extLst>
       <p:ext uri="{BB962C8B-B14F-4D97-AF65-F5344CB8AC3E}">
-        <p14:creationId xmlns:p14="http://schemas.microsoft.com/office/powerpoint/2010/main" val="1665671459"/>
+        <p14:creationId xmlns:p14="http://schemas.microsoft.com/office/powerpoint/2010/main" val="1120469968"/>
       </p:ext>
     </p:extLst>
   </p:cSld>
@@ -4869,7 +5042,7 @@
           <p:cNvPr id="2" name="Title 1">
             <a:extLst>
               <a:ext uri="{FF2B5EF4-FFF2-40B4-BE49-F238E27FC236}">
-                <a16:creationId xmlns:a16="http://schemas.microsoft.com/office/drawing/2014/main" id="{55B31744-ED95-32F9-D88F-27B03B231DE0}"/>
+                <a16:creationId xmlns:a16="http://schemas.microsoft.com/office/drawing/2014/main" id="{A5006C5D-EA9F-CC08-ECD9-2455835FF970}"/>
               </a:ext>
             </a:extLst>
           </p:cNvPr>
@@ -4885,27 +5058,16 @@
           <a:bodyPr/>
           <a:lstStyle/>
           <a:p>
-            <a:r>
-              <a:rPr lang="en-US" dirty="0"/>
-              <a:t>Crescendo or -o </a:t>
-            </a:r>
-            <a:r>
-              <a:rPr lang="en-US" dirty="0" err="1"/>
-              <a:t>json</a:t>
-            </a:r>
-            <a:r>
-              <a:rPr lang="en-US" dirty="0"/>
-              <a:t>?</a:t>
-            </a:r>
-          </a:p>
-        </p:txBody>
-      </p:sp>
-      <p:sp>
-        <p:nvSpPr>
-          <p:cNvPr id="3" name="Content Placeholder 2">
-            <a:extLst>
-              <a:ext uri="{FF2B5EF4-FFF2-40B4-BE49-F238E27FC236}">
-                <a16:creationId xmlns:a16="http://schemas.microsoft.com/office/drawing/2014/main" id="{22AB60D4-7F39-36CB-F888-35C18D054A28}"/>
+            <a:endParaRPr lang="en-US"/>
+          </a:p>
+        </p:txBody>
+      </p:sp>
+      <p:sp>
+        <p:nvSpPr>
+          <p:cNvPr id="10" name="Content Placeholder 9">
+            <a:extLst>
+              <a:ext uri="{FF2B5EF4-FFF2-40B4-BE49-F238E27FC236}">
+                <a16:creationId xmlns:a16="http://schemas.microsoft.com/office/drawing/2014/main" id="{5AA03517-9DB4-4DE2-D552-1BFCAE6FA533}"/>
               </a:ext>
             </a:extLst>
           </p:cNvPr>
@@ -4921,84 +5083,44 @@
           <a:bodyPr/>
           <a:lstStyle/>
           <a:p>
-            <a:r>
-              <a:rPr lang="en-US" dirty="0"/>
-              <a:t>Crescendo</a:t>
-            </a:r>
-          </a:p>
-          <a:p>
-            <a:pPr lvl="1"/>
-            <a:r>
-              <a:rPr lang="en-US" dirty="0"/>
-              <a:t>Definitely more PowerShell-y (verb-noun)</a:t>
-            </a:r>
-          </a:p>
-          <a:p>
-            <a:pPr lvl="1"/>
-            <a:r>
-              <a:rPr lang="en-US" dirty="0"/>
-              <a:t>Not cross-shell compatible</a:t>
-            </a:r>
-          </a:p>
-          <a:p>
-            <a:pPr lvl="1"/>
-            <a:r>
-              <a:rPr lang="en-US" dirty="0"/>
-              <a:t>Not a bad tool, just not the right tool for the job</a:t>
-            </a:r>
-          </a:p>
-          <a:p>
-            <a:r>
-              <a:rPr lang="en-US" dirty="0" err="1"/>
-              <a:t>kubectl</a:t>
-            </a:r>
-            <a:r>
-              <a:rPr lang="en-US" dirty="0"/>
-              <a:t> get pod -o </a:t>
-            </a:r>
-            <a:r>
-              <a:rPr lang="en-US" dirty="0" err="1"/>
-              <a:t>json</a:t>
-            </a:r>
-            <a:r>
-              <a:rPr lang="en-US" dirty="0"/>
-              <a:t> | </a:t>
-            </a:r>
-            <a:r>
-              <a:rPr lang="en-US" dirty="0" err="1"/>
-              <a:t>ConvertFrom-Json</a:t>
-            </a:r>
-            <a:endParaRPr lang="en-US" dirty="0"/>
-          </a:p>
-          <a:p>
-            <a:pPr lvl="1"/>
-            <a:r>
-              <a:rPr lang="en-US" dirty="0"/>
-              <a:t>Too much typing</a:t>
-            </a:r>
-          </a:p>
-          <a:p>
-            <a:pPr lvl="1"/>
-            <a:r>
-              <a:rPr lang="en-US" dirty="0"/>
-              <a:t>Too much data</a:t>
-            </a:r>
-            <a:r>
-              <a:rPr lang="en-US"/>
-              <a:t>, usually</a:t>
-            </a:r>
-            <a:endParaRPr lang="en-US" dirty="0"/>
-          </a:p>
-          <a:p>
-            <a:pPr lvl="1"/>
-            <a:endParaRPr lang="en-US" dirty="0"/>
-          </a:p>
-        </p:txBody>
-      </p:sp>
+            <a:endParaRPr lang="en-US"/>
+          </a:p>
+        </p:txBody>
+      </p:sp>
+      <p:pic>
+        <p:nvPicPr>
+          <p:cNvPr id="12" name="Picture 11">
+            <a:extLst>
+              <a:ext uri="{FF2B5EF4-FFF2-40B4-BE49-F238E27FC236}">
+                <a16:creationId xmlns:a16="http://schemas.microsoft.com/office/drawing/2014/main" id="{C4F23B3B-B4FC-6FFB-3EDE-A7942907E863}"/>
+              </a:ext>
+            </a:extLst>
+          </p:cNvPr>
+          <p:cNvPicPr>
+            <a:picLocks noChangeAspect="1"/>
+          </p:cNvPicPr>
+          <p:nvPr/>
+        </p:nvPicPr>
+        <p:blipFill>
+          <a:blip r:embed="rId2"/>
+          <a:stretch>
+            <a:fillRect/>
+          </a:stretch>
+        </p:blipFill>
+        <p:spPr>
+          <a:xfrm>
+            <a:off x="0" y="0"/>
+            <a:ext cx="12192000" cy="6858000"/>
+          </a:xfrm>
+          <a:prstGeom prst="rect">
+            <a:avLst/>
+          </a:prstGeom>
+        </p:spPr>
+      </p:pic>
     </p:spTree>
     <p:extLst>
       <p:ext uri="{BB962C8B-B14F-4D97-AF65-F5344CB8AC3E}">
-        <p14:creationId xmlns:p14="http://schemas.microsoft.com/office/powerpoint/2010/main" val="1120469968"/>
+        <p14:creationId xmlns:p14="http://schemas.microsoft.com/office/powerpoint/2010/main" val="19617190"/>
       </p:ext>
     </p:extLst>
   </p:cSld>
@@ -5080,15 +5202,7 @@
             </a:pPr>
             <a:r>
               <a:rPr lang="en-US" dirty="0"/>
-              <a:t>Reliably and efficiently parse </a:t>
-            </a:r>
-            <a:r>
-              <a:rPr lang="en-US" dirty="0" err="1"/>
-              <a:t>Kubectl</a:t>
-            </a:r>
-            <a:r>
-              <a:rPr lang="en-US" dirty="0"/>
-              <a:t> output</a:t>
+              <a:t>Preserve syntax</a:t>
             </a:r>
           </a:p>
           <a:p>
@@ -5098,7 +5212,7 @@
             </a:pPr>
             <a:r>
               <a:rPr lang="en-US" dirty="0"/>
-              <a:t>Preserve syntax</a:t>
+              <a:t>Preserve output format</a:t>
             </a:r>
           </a:p>
           <a:p>
@@ -5108,15 +5222,7 @@
             </a:pPr>
             <a:r>
               <a:rPr lang="en-US" dirty="0"/>
-              <a:t>Maintain </a:t>
-            </a:r>
-            <a:r>
-              <a:rPr lang="en-US" dirty="0" err="1"/>
-              <a:t>Kubectl’s</a:t>
-            </a:r>
-            <a:r>
-              <a:rPr lang="en-US" dirty="0"/>
-              <a:t> table output format</a:t>
+              <a:t>Keep it reliable and efficient</a:t>
             </a:r>
           </a:p>
         </p:txBody>
@@ -5288,9 +5394,10 @@
           <a:lstStyle/>
           <a:p>
             <a:r>
-              <a:rPr lang="en-US" dirty="0"/>
-              <a:t>PowerShell</a:t>
-            </a:r>
+              <a:rPr lang="en-US"/>
+              <a:t>PowerShell 7+</a:t>
+            </a:r>
+            <a:endParaRPr lang="en-US" dirty="0"/>
           </a:p>
           <a:p>
             <a:r>

</xml_diff>